<commit_message>
Adding a section on concept sets to cohorts chapter
</commit_message>
<xml_diff>
--- a/extras/FiguresCohorts.pptx
+++ b/extras/FiguresCohorts.pptx
@@ -5,12 +5,13 @@
     <p:sldMasterId id="2147483648" r:id="rId1"/>
   </p:sldMasterIdLst>
   <p:notesMasterIdLst>
-    <p:notesMasterId r:id="rId5"/>
+    <p:notesMasterId r:id="rId6"/>
   </p:notesMasterIdLst>
   <p:sldIdLst>
-    <p:sldId id="260" r:id="rId2"/>
-    <p:sldId id="257" r:id="rId3"/>
-    <p:sldId id="259" r:id="rId4"/>
+    <p:sldId id="261" r:id="rId2"/>
+    <p:sldId id="260" r:id="rId3"/>
+    <p:sldId id="257" r:id="rId4"/>
+    <p:sldId id="259" r:id="rId5"/>
   </p:sldIdLst>
   <p:sldSz cx="12192000" cy="6858000"/>
   <p:notesSz cx="6858000" cy="9144000"/>
@@ -199,7 +200,7 @@
           <a:p>
             <a:fld id="{11F35D42-B289-4E75-A561-9E2C00FF53CB}" type="datetimeFigureOut">
               <a:rPr lang="en-US" smtClean="0"/>
-              <a:t>8/21/2019</a:t>
+              <a:t>8/24/2019</a:t>
             </a:fld>
             <a:endParaRPr lang="en-US"/>
           </a:p>
@@ -595,7 +596,7 @@
           <a:p>
             <a:fld id="{14CB5BB6-F18B-47EB-9C71-5D2DB8A6B930}" type="datetimeFigureOut">
               <a:rPr lang="en-US" smtClean="0"/>
-              <a:t>8/21/2019</a:t>
+              <a:t>8/24/2019</a:t>
             </a:fld>
             <a:endParaRPr lang="en-US"/>
           </a:p>
@@ -763,7 +764,7 @@
           <a:p>
             <a:fld id="{14CB5BB6-F18B-47EB-9C71-5D2DB8A6B930}" type="datetimeFigureOut">
               <a:rPr lang="en-US" smtClean="0"/>
-              <a:t>8/21/2019</a:t>
+              <a:t>8/24/2019</a:t>
             </a:fld>
             <a:endParaRPr lang="en-US"/>
           </a:p>
@@ -941,7 +942,7 @@
           <a:p>
             <a:fld id="{14CB5BB6-F18B-47EB-9C71-5D2DB8A6B930}" type="datetimeFigureOut">
               <a:rPr lang="en-US" smtClean="0"/>
-              <a:t>8/21/2019</a:t>
+              <a:t>8/24/2019</a:t>
             </a:fld>
             <a:endParaRPr lang="en-US"/>
           </a:p>
@@ -1109,7 +1110,7 @@
           <a:p>
             <a:fld id="{14CB5BB6-F18B-47EB-9C71-5D2DB8A6B930}" type="datetimeFigureOut">
               <a:rPr lang="en-US" smtClean="0"/>
-              <a:t>8/21/2019</a:t>
+              <a:t>8/24/2019</a:t>
             </a:fld>
             <a:endParaRPr lang="en-US"/>
           </a:p>
@@ -1354,7 +1355,7 @@
           <a:p>
             <a:fld id="{14CB5BB6-F18B-47EB-9C71-5D2DB8A6B930}" type="datetimeFigureOut">
               <a:rPr lang="en-US" smtClean="0"/>
-              <a:t>8/21/2019</a:t>
+              <a:t>8/24/2019</a:t>
             </a:fld>
             <a:endParaRPr lang="en-US"/>
           </a:p>
@@ -1583,7 +1584,7 @@
           <a:p>
             <a:fld id="{14CB5BB6-F18B-47EB-9C71-5D2DB8A6B930}" type="datetimeFigureOut">
               <a:rPr lang="en-US" smtClean="0"/>
-              <a:t>8/21/2019</a:t>
+              <a:t>8/24/2019</a:t>
             </a:fld>
             <a:endParaRPr lang="en-US"/>
           </a:p>
@@ -1947,7 +1948,7 @@
           <a:p>
             <a:fld id="{14CB5BB6-F18B-47EB-9C71-5D2DB8A6B930}" type="datetimeFigureOut">
               <a:rPr lang="en-US" smtClean="0"/>
-              <a:t>8/21/2019</a:t>
+              <a:t>8/24/2019</a:t>
             </a:fld>
             <a:endParaRPr lang="en-US"/>
           </a:p>
@@ -2064,7 +2065,7 @@
           <a:p>
             <a:fld id="{14CB5BB6-F18B-47EB-9C71-5D2DB8A6B930}" type="datetimeFigureOut">
               <a:rPr lang="en-US" smtClean="0"/>
-              <a:t>8/21/2019</a:t>
+              <a:t>8/24/2019</a:t>
             </a:fld>
             <a:endParaRPr lang="en-US"/>
           </a:p>
@@ -2159,7 +2160,7 @@
           <a:p>
             <a:fld id="{14CB5BB6-F18B-47EB-9C71-5D2DB8A6B930}" type="datetimeFigureOut">
               <a:rPr lang="en-US" smtClean="0"/>
-              <a:t>8/21/2019</a:t>
+              <a:t>8/24/2019</a:t>
             </a:fld>
             <a:endParaRPr lang="en-US"/>
           </a:p>
@@ -2434,7 +2435,7 @@
           <a:p>
             <a:fld id="{14CB5BB6-F18B-47EB-9C71-5D2DB8A6B930}" type="datetimeFigureOut">
               <a:rPr lang="en-US" smtClean="0"/>
-              <a:t>8/21/2019</a:t>
+              <a:t>8/24/2019</a:t>
             </a:fld>
             <a:endParaRPr lang="en-US"/>
           </a:p>
@@ -2686,7 +2687,7 @@
           <a:p>
             <a:fld id="{14CB5BB6-F18B-47EB-9C71-5D2DB8A6B930}" type="datetimeFigureOut">
               <a:rPr lang="en-US" smtClean="0"/>
-              <a:t>8/21/2019</a:t>
+              <a:t>8/24/2019</a:t>
             </a:fld>
             <a:endParaRPr lang="en-US"/>
           </a:p>
@@ -2897,7 +2898,7 @@
           <a:p>
             <a:fld id="{14CB5BB6-F18B-47EB-9C71-5D2DB8A6B930}" type="datetimeFigureOut">
               <a:rPr lang="en-US" smtClean="0"/>
-              <a:t>8/21/2019</a:t>
+              <a:t>8/24/2019</a:t>
             </a:fld>
             <a:endParaRPr lang="en-US"/>
           </a:p>
@@ -3304,6 +3305,1141 @@
       </p:grpSpPr>
       <p:sp>
         <p:nvSpPr>
+          <p:cNvPr id="6" name="Rectangle: Rounded Corners 5">
+            <a:extLst>
+              <a:ext uri="{FF2B5EF4-FFF2-40B4-BE49-F238E27FC236}">
+                <a16:creationId xmlns:a16="http://schemas.microsoft.com/office/drawing/2014/main" id="{B6E80436-EA0F-498F-B4F2-B893B6ED47B6}"/>
+              </a:ext>
+            </a:extLst>
+          </p:cNvPr>
+          <p:cNvSpPr/>
+          <p:nvPr/>
+        </p:nvSpPr>
+        <p:spPr>
+          <a:xfrm>
+            <a:off x="3385915" y="57873"/>
+            <a:ext cx="1267428" cy="504465"/>
+          </a:xfrm>
+          <a:prstGeom prst="roundRect">
+            <a:avLst/>
+          </a:prstGeom>
+          <a:solidFill>
+            <a:srgbClr val="1B6583"/>
+          </a:solidFill>
+          <a:ln>
+            <a:noFill/>
+          </a:ln>
+        </p:spPr>
+        <p:style>
+          <a:lnRef idx="2">
+            <a:schemeClr val="accent5">
+              <a:shade val="50000"/>
+            </a:schemeClr>
+          </a:lnRef>
+          <a:fillRef idx="1">
+            <a:schemeClr val="accent5"/>
+          </a:fillRef>
+          <a:effectRef idx="0">
+            <a:schemeClr val="accent5"/>
+          </a:effectRef>
+          <a:fontRef idx="minor">
+            <a:schemeClr val="lt1"/>
+          </a:fontRef>
+        </p:style>
+        <p:txBody>
+          <a:bodyPr rtlCol="0" anchor="ctr"/>
+          <a:lstStyle/>
+          <a:p>
+            <a:pPr algn="ctr"/>
+            <a:r>
+              <a:rPr lang="en-US" sz="1100" dirty="0"/>
+              <a:t>Myocardial infarction</a:t>
+            </a:r>
+          </a:p>
+          <a:p>
+            <a:pPr algn="ctr"/>
+            <a:r>
+              <a:rPr lang="en-US" sz="1100" dirty="0">
+                <a:solidFill>
+                  <a:srgbClr val="A9DAED"/>
+                </a:solidFill>
+              </a:rPr>
+              <a:t>4329847</a:t>
+            </a:r>
+          </a:p>
+        </p:txBody>
+      </p:sp>
+      <p:sp>
+        <p:nvSpPr>
+          <p:cNvPr id="7" name="Rectangle: Rounded Corners 6">
+            <a:extLst>
+              <a:ext uri="{FF2B5EF4-FFF2-40B4-BE49-F238E27FC236}">
+                <a16:creationId xmlns:a16="http://schemas.microsoft.com/office/drawing/2014/main" id="{9F651E6E-1093-48C4-9284-302C80CCC6A9}"/>
+              </a:ext>
+            </a:extLst>
+          </p:cNvPr>
+          <p:cNvSpPr/>
+          <p:nvPr/>
+        </p:nvSpPr>
+        <p:spPr>
+          <a:xfrm>
+            <a:off x="2722300" y="927274"/>
+            <a:ext cx="1267428" cy="504465"/>
+          </a:xfrm>
+          <a:prstGeom prst="roundRect">
+            <a:avLst/>
+          </a:prstGeom>
+          <a:solidFill>
+            <a:srgbClr val="44AED8"/>
+          </a:solidFill>
+          <a:ln>
+            <a:noFill/>
+          </a:ln>
+        </p:spPr>
+        <p:style>
+          <a:lnRef idx="2">
+            <a:schemeClr val="accent5">
+              <a:shade val="50000"/>
+            </a:schemeClr>
+          </a:lnRef>
+          <a:fillRef idx="1">
+            <a:schemeClr val="accent5"/>
+          </a:fillRef>
+          <a:effectRef idx="0">
+            <a:schemeClr val="accent5"/>
+          </a:effectRef>
+          <a:fontRef idx="minor">
+            <a:schemeClr val="lt1"/>
+          </a:fontRef>
+        </p:style>
+        <p:txBody>
+          <a:bodyPr rtlCol="0" anchor="ctr"/>
+          <a:lstStyle/>
+          <a:p>
+            <a:pPr algn="ctr"/>
+            <a:r>
+              <a:rPr lang="en-US" sz="1100" dirty="0"/>
+              <a:t>Silent myocardial infarction</a:t>
+            </a:r>
+          </a:p>
+          <a:p>
+            <a:pPr algn="ctr"/>
+            <a:r>
+              <a:rPr lang="en-US" sz="1100" dirty="0">
+                <a:solidFill>
+                  <a:srgbClr val="D9EEF7"/>
+                </a:solidFill>
+              </a:rPr>
+              <a:t>4124686</a:t>
+            </a:r>
+          </a:p>
+        </p:txBody>
+      </p:sp>
+      <p:sp>
+        <p:nvSpPr>
+          <p:cNvPr id="9" name="Rectangle: Rounded Corners 8">
+            <a:extLst>
+              <a:ext uri="{FF2B5EF4-FFF2-40B4-BE49-F238E27FC236}">
+                <a16:creationId xmlns:a16="http://schemas.microsoft.com/office/drawing/2014/main" id="{5D89E711-1C69-4E07-8C39-2722E1CC5B5A}"/>
+              </a:ext>
+            </a:extLst>
+          </p:cNvPr>
+          <p:cNvSpPr/>
+          <p:nvPr/>
+        </p:nvSpPr>
+        <p:spPr>
+          <a:xfrm>
+            <a:off x="5376760" y="927274"/>
+            <a:ext cx="1267428" cy="504465"/>
+          </a:xfrm>
+          <a:prstGeom prst="roundRect">
+            <a:avLst/>
+          </a:prstGeom>
+          <a:solidFill>
+            <a:schemeClr val="bg1"/>
+          </a:solidFill>
+          <a:ln>
+            <a:solidFill>
+              <a:schemeClr val="bg1"/>
+            </a:solidFill>
+          </a:ln>
+        </p:spPr>
+        <p:style>
+          <a:lnRef idx="2">
+            <a:schemeClr val="accent5">
+              <a:shade val="50000"/>
+            </a:schemeClr>
+          </a:lnRef>
+          <a:fillRef idx="1">
+            <a:schemeClr val="accent5"/>
+          </a:fillRef>
+          <a:effectRef idx="0">
+            <a:schemeClr val="accent5"/>
+          </a:effectRef>
+          <a:fontRef idx="minor">
+            <a:schemeClr val="lt1"/>
+          </a:fontRef>
+        </p:style>
+        <p:txBody>
+          <a:bodyPr rtlCol="0" anchor="ctr"/>
+          <a:lstStyle/>
+          <a:p>
+            <a:pPr algn="ctr"/>
+            <a:r>
+              <a:rPr lang="en-US" sz="2400" dirty="0">
+                <a:solidFill>
+                  <a:schemeClr val="tx1"/>
+                </a:solidFill>
+              </a:rPr>
+              <a:t>…</a:t>
+            </a:r>
+          </a:p>
+        </p:txBody>
+      </p:sp>
+      <p:sp>
+        <p:nvSpPr>
+          <p:cNvPr id="10" name="Rectangle: Rounded Corners 9">
+            <a:extLst>
+              <a:ext uri="{FF2B5EF4-FFF2-40B4-BE49-F238E27FC236}">
+                <a16:creationId xmlns:a16="http://schemas.microsoft.com/office/drawing/2014/main" id="{2B09F3CD-A858-4296-BBEF-79BA37821F7A}"/>
+              </a:ext>
+            </a:extLst>
+          </p:cNvPr>
+          <p:cNvSpPr/>
+          <p:nvPr/>
+        </p:nvSpPr>
+        <p:spPr>
+          <a:xfrm>
+            <a:off x="1397794" y="927274"/>
+            <a:ext cx="1264704" cy="504465"/>
+          </a:xfrm>
+          <a:prstGeom prst="roundRect">
+            <a:avLst/>
+          </a:prstGeom>
+          <a:solidFill>
+            <a:schemeClr val="bg1"/>
+          </a:solidFill>
+          <a:ln>
+            <a:solidFill>
+              <a:srgbClr val="1B6583"/>
+            </a:solidFill>
+            <a:prstDash val="dash"/>
+          </a:ln>
+        </p:spPr>
+        <p:style>
+          <a:lnRef idx="2">
+            <a:schemeClr val="accent5">
+              <a:shade val="50000"/>
+            </a:schemeClr>
+          </a:lnRef>
+          <a:fillRef idx="1">
+            <a:schemeClr val="accent5"/>
+          </a:fillRef>
+          <a:effectRef idx="0">
+            <a:schemeClr val="accent5"/>
+          </a:effectRef>
+          <a:fontRef idx="minor">
+            <a:schemeClr val="lt1"/>
+          </a:fontRef>
+        </p:style>
+        <p:txBody>
+          <a:bodyPr rtlCol="0" anchor="ctr"/>
+          <a:lstStyle/>
+          <a:p>
+            <a:pPr algn="ctr"/>
+            <a:r>
+              <a:rPr lang="en-US" sz="1100" dirty="0">
+                <a:solidFill>
+                  <a:schemeClr val="tx1"/>
+                </a:solidFill>
+              </a:rPr>
+              <a:t>Old myocardial infarction</a:t>
+            </a:r>
+          </a:p>
+          <a:p>
+            <a:pPr algn="ctr"/>
+            <a:r>
+              <a:rPr lang="en-US" sz="1100" dirty="0">
+                <a:solidFill>
+                  <a:schemeClr val="tx1">
+                    <a:lumMod val="50000"/>
+                    <a:lumOff val="50000"/>
+                  </a:schemeClr>
+                </a:solidFill>
+              </a:rPr>
+              <a:t>314666</a:t>
+            </a:r>
+          </a:p>
+        </p:txBody>
+      </p:sp>
+      <p:cxnSp>
+        <p:nvCxnSpPr>
+          <p:cNvPr id="11" name="Connector: Elbow 10">
+            <a:extLst>
+              <a:ext uri="{FF2B5EF4-FFF2-40B4-BE49-F238E27FC236}">
+                <a16:creationId xmlns:a16="http://schemas.microsoft.com/office/drawing/2014/main" id="{1B1B3DFF-CB15-4CC7-8C90-0B0C688C5F3C}"/>
+              </a:ext>
+            </a:extLst>
+          </p:cNvPr>
+          <p:cNvCxnSpPr>
+            <a:cxnSpLocks/>
+            <a:stCxn id="6" idx="2"/>
+            <a:endCxn id="7" idx="0"/>
+          </p:cNvCxnSpPr>
+          <p:nvPr/>
+        </p:nvCxnSpPr>
+        <p:spPr>
+          <a:xfrm rot="5400000">
+            <a:off x="3505354" y="412999"/>
+            <a:ext cx="364936" cy="663615"/>
+          </a:xfrm>
+          <a:prstGeom prst="bentConnector3">
+            <a:avLst>
+              <a:gd name="adj1" fmla="val 50000"/>
+            </a:avLst>
+          </a:prstGeom>
+          <a:ln w="12700">
+            <a:solidFill>
+              <a:schemeClr val="tx1"/>
+            </a:solidFill>
+            <a:tailEnd type="triangle"/>
+          </a:ln>
+        </p:spPr>
+        <p:style>
+          <a:lnRef idx="1">
+            <a:schemeClr val="dk1"/>
+          </a:lnRef>
+          <a:fillRef idx="0">
+            <a:schemeClr val="dk1"/>
+          </a:fillRef>
+          <a:effectRef idx="0">
+            <a:schemeClr val="dk1"/>
+          </a:effectRef>
+          <a:fontRef idx="minor">
+            <a:schemeClr val="tx1"/>
+          </a:fontRef>
+        </p:style>
+      </p:cxnSp>
+      <p:cxnSp>
+        <p:nvCxnSpPr>
+          <p:cNvPr id="14" name="Connector: Elbow 13">
+            <a:extLst>
+              <a:ext uri="{FF2B5EF4-FFF2-40B4-BE49-F238E27FC236}">
+                <a16:creationId xmlns:a16="http://schemas.microsoft.com/office/drawing/2014/main" id="{EA40FCBE-5794-4DB3-BBBD-FA88C00F1B24}"/>
+              </a:ext>
+            </a:extLst>
+          </p:cNvPr>
+          <p:cNvCxnSpPr>
+            <a:cxnSpLocks/>
+            <a:stCxn id="6" idx="2"/>
+            <a:endCxn id="9" idx="0"/>
+          </p:cNvCxnSpPr>
+          <p:nvPr/>
+        </p:nvCxnSpPr>
+        <p:spPr>
+          <a:xfrm rot="16200000" flipH="1">
+            <a:off x="4832583" y="-250617"/>
+            <a:ext cx="364936" cy="1990845"/>
+          </a:xfrm>
+          <a:prstGeom prst="bentConnector3">
+            <a:avLst>
+              <a:gd name="adj1" fmla="val 50000"/>
+            </a:avLst>
+          </a:prstGeom>
+          <a:ln w="12700">
+            <a:solidFill>
+              <a:schemeClr val="tx1"/>
+            </a:solidFill>
+            <a:tailEnd type="triangle"/>
+          </a:ln>
+        </p:spPr>
+        <p:style>
+          <a:lnRef idx="1">
+            <a:schemeClr val="dk1"/>
+          </a:lnRef>
+          <a:fillRef idx="0">
+            <a:schemeClr val="dk1"/>
+          </a:fillRef>
+          <a:effectRef idx="0">
+            <a:schemeClr val="dk1"/>
+          </a:effectRef>
+          <a:fontRef idx="minor">
+            <a:schemeClr val="tx1"/>
+          </a:fontRef>
+        </p:style>
+      </p:cxnSp>
+      <p:cxnSp>
+        <p:nvCxnSpPr>
+          <p:cNvPr id="17" name="Connector: Elbow 16">
+            <a:extLst>
+              <a:ext uri="{FF2B5EF4-FFF2-40B4-BE49-F238E27FC236}">
+                <a16:creationId xmlns:a16="http://schemas.microsoft.com/office/drawing/2014/main" id="{80940AD9-A2EF-4FBA-B5AD-12BAEB901DE6}"/>
+              </a:ext>
+            </a:extLst>
+          </p:cNvPr>
+          <p:cNvCxnSpPr>
+            <a:cxnSpLocks/>
+            <a:stCxn id="6" idx="2"/>
+            <a:endCxn id="10" idx="0"/>
+          </p:cNvCxnSpPr>
+          <p:nvPr/>
+        </p:nvCxnSpPr>
+        <p:spPr>
+          <a:xfrm rot="5400000">
+            <a:off x="2842420" y="-249935"/>
+            <a:ext cx="364936" cy="1989483"/>
+          </a:xfrm>
+          <a:prstGeom prst="bentConnector3">
+            <a:avLst>
+              <a:gd name="adj1" fmla="val 50000"/>
+            </a:avLst>
+          </a:prstGeom>
+          <a:ln w="12700">
+            <a:solidFill>
+              <a:schemeClr val="tx1"/>
+            </a:solidFill>
+            <a:tailEnd type="triangle"/>
+          </a:ln>
+        </p:spPr>
+        <p:style>
+          <a:lnRef idx="1">
+            <a:schemeClr val="dk1"/>
+          </a:lnRef>
+          <a:fillRef idx="0">
+            <a:schemeClr val="dk1"/>
+          </a:fillRef>
+          <a:effectRef idx="0">
+            <a:schemeClr val="dk1"/>
+          </a:effectRef>
+          <a:fontRef idx="minor">
+            <a:schemeClr val="tx1"/>
+          </a:fontRef>
+        </p:style>
+      </p:cxnSp>
+      <p:sp>
+        <p:nvSpPr>
+          <p:cNvPr id="21" name="Rectangle: Rounded Corners 20">
+            <a:extLst>
+              <a:ext uri="{FF2B5EF4-FFF2-40B4-BE49-F238E27FC236}">
+                <a16:creationId xmlns:a16="http://schemas.microsoft.com/office/drawing/2014/main" id="{8D40F833-3788-4BED-84D1-000AB13BED16}"/>
+              </a:ext>
+            </a:extLst>
+          </p:cNvPr>
+          <p:cNvSpPr/>
+          <p:nvPr/>
+        </p:nvSpPr>
+        <p:spPr>
+          <a:xfrm>
+            <a:off x="4049530" y="927274"/>
+            <a:ext cx="1267428" cy="504465"/>
+          </a:xfrm>
+          <a:prstGeom prst="roundRect">
+            <a:avLst/>
+          </a:prstGeom>
+          <a:solidFill>
+            <a:srgbClr val="44AED8"/>
+          </a:solidFill>
+          <a:ln>
+            <a:noFill/>
+          </a:ln>
+        </p:spPr>
+        <p:style>
+          <a:lnRef idx="2">
+            <a:schemeClr val="accent5">
+              <a:shade val="50000"/>
+            </a:schemeClr>
+          </a:lnRef>
+          <a:fillRef idx="1">
+            <a:schemeClr val="accent5"/>
+          </a:fillRef>
+          <a:effectRef idx="0">
+            <a:schemeClr val="accent5"/>
+          </a:effectRef>
+          <a:fontRef idx="minor">
+            <a:schemeClr val="lt1"/>
+          </a:fontRef>
+        </p:style>
+        <p:txBody>
+          <a:bodyPr rtlCol="0" anchor="ctr"/>
+          <a:lstStyle/>
+          <a:p>
+            <a:pPr algn="ctr"/>
+            <a:r>
+              <a:rPr lang="en-US" sz="1100" dirty="0"/>
+              <a:t>Acute myocardial infarction</a:t>
+            </a:r>
+          </a:p>
+          <a:p>
+            <a:pPr algn="ctr"/>
+            <a:r>
+              <a:rPr lang="en-US" sz="1100" dirty="0">
+                <a:solidFill>
+                  <a:srgbClr val="D9EEF7"/>
+                </a:solidFill>
+              </a:rPr>
+              <a:t>312327</a:t>
+            </a:r>
+          </a:p>
+        </p:txBody>
+      </p:sp>
+      <p:cxnSp>
+        <p:nvCxnSpPr>
+          <p:cNvPr id="23" name="Connector: Elbow 22">
+            <a:extLst>
+              <a:ext uri="{FF2B5EF4-FFF2-40B4-BE49-F238E27FC236}">
+                <a16:creationId xmlns:a16="http://schemas.microsoft.com/office/drawing/2014/main" id="{A74211D8-6211-43FF-9A57-4DAD552C0CF6}"/>
+              </a:ext>
+            </a:extLst>
+          </p:cNvPr>
+          <p:cNvCxnSpPr>
+            <a:cxnSpLocks/>
+            <a:stCxn id="6" idx="2"/>
+            <a:endCxn id="21" idx="0"/>
+          </p:cNvCxnSpPr>
+          <p:nvPr/>
+        </p:nvCxnSpPr>
+        <p:spPr>
+          <a:xfrm rot="16200000" flipH="1">
+            <a:off x="4168968" y="412998"/>
+            <a:ext cx="364936" cy="663615"/>
+          </a:xfrm>
+          <a:prstGeom prst="bentConnector3">
+            <a:avLst>
+              <a:gd name="adj1" fmla="val 50000"/>
+            </a:avLst>
+          </a:prstGeom>
+          <a:ln w="12700">
+            <a:solidFill>
+              <a:schemeClr val="tx1"/>
+            </a:solidFill>
+            <a:tailEnd type="triangle"/>
+          </a:ln>
+        </p:spPr>
+        <p:style>
+          <a:lnRef idx="1">
+            <a:schemeClr val="dk1"/>
+          </a:lnRef>
+          <a:fillRef idx="0">
+            <a:schemeClr val="dk1"/>
+          </a:fillRef>
+          <a:effectRef idx="0">
+            <a:schemeClr val="dk1"/>
+          </a:effectRef>
+          <a:fontRef idx="minor">
+            <a:schemeClr val="tx1"/>
+          </a:fontRef>
+        </p:style>
+      </p:cxnSp>
+      <p:sp>
+        <p:nvSpPr>
+          <p:cNvPr id="27" name="Rectangle: Rounded Corners 26">
+            <a:extLst>
+              <a:ext uri="{FF2B5EF4-FFF2-40B4-BE49-F238E27FC236}">
+                <a16:creationId xmlns:a16="http://schemas.microsoft.com/office/drawing/2014/main" id="{BB832365-099C-4580-98C0-38466CB1D6DA}"/>
+              </a:ext>
+            </a:extLst>
+          </p:cNvPr>
+          <p:cNvSpPr/>
+          <p:nvPr/>
+        </p:nvSpPr>
+        <p:spPr>
+          <a:xfrm>
+            <a:off x="67580" y="1756449"/>
+            <a:ext cx="1267428" cy="504465"/>
+          </a:xfrm>
+          <a:prstGeom prst="roundRect">
+            <a:avLst/>
+          </a:prstGeom>
+          <a:solidFill>
+            <a:schemeClr val="bg1"/>
+          </a:solidFill>
+          <a:ln>
+            <a:solidFill>
+              <a:srgbClr val="44AED8"/>
+            </a:solidFill>
+            <a:prstDash val="dash"/>
+          </a:ln>
+        </p:spPr>
+        <p:style>
+          <a:lnRef idx="2">
+            <a:schemeClr val="accent5">
+              <a:shade val="50000"/>
+            </a:schemeClr>
+          </a:lnRef>
+          <a:fillRef idx="1">
+            <a:schemeClr val="accent5"/>
+          </a:fillRef>
+          <a:effectRef idx="0">
+            <a:schemeClr val="accent5"/>
+          </a:effectRef>
+          <a:fontRef idx="minor">
+            <a:schemeClr val="lt1"/>
+          </a:fontRef>
+        </p:style>
+        <p:txBody>
+          <a:bodyPr rtlCol="0" anchor="ctr"/>
+          <a:lstStyle/>
+          <a:p>
+            <a:pPr algn="ctr"/>
+            <a:r>
+              <a:rPr lang="en-US" sz="1100" dirty="0">
+                <a:solidFill>
+                  <a:schemeClr val="tx1"/>
+                </a:solidFill>
+              </a:rPr>
+              <a:t>Old anterior MI</a:t>
+            </a:r>
+          </a:p>
+          <a:p>
+            <a:pPr algn="ctr"/>
+            <a:r>
+              <a:rPr lang="en-US" sz="1100" dirty="0">
+                <a:solidFill>
+                  <a:schemeClr val="tx1">
+                    <a:lumMod val="50000"/>
+                    <a:lumOff val="50000"/>
+                  </a:schemeClr>
+                </a:solidFill>
+              </a:rPr>
+              <a:t>4119949</a:t>
+            </a:r>
+          </a:p>
+        </p:txBody>
+      </p:sp>
+      <p:cxnSp>
+        <p:nvCxnSpPr>
+          <p:cNvPr id="36" name="Connector: Elbow 35">
+            <a:extLst>
+              <a:ext uri="{FF2B5EF4-FFF2-40B4-BE49-F238E27FC236}">
+                <a16:creationId xmlns:a16="http://schemas.microsoft.com/office/drawing/2014/main" id="{94B88243-F75E-41C1-B5E7-57A00416F08F}"/>
+              </a:ext>
+            </a:extLst>
+          </p:cNvPr>
+          <p:cNvCxnSpPr>
+            <a:cxnSpLocks/>
+            <a:stCxn id="10" idx="2"/>
+            <a:endCxn id="27" idx="0"/>
+          </p:cNvCxnSpPr>
+          <p:nvPr/>
+        </p:nvCxnSpPr>
+        <p:spPr>
+          <a:xfrm rot="5400000">
+            <a:off x="1203365" y="929668"/>
+            <a:ext cx="324710" cy="1328852"/>
+          </a:xfrm>
+          <a:prstGeom prst="bentConnector3">
+            <a:avLst>
+              <a:gd name="adj1" fmla="val 50000"/>
+            </a:avLst>
+          </a:prstGeom>
+          <a:ln w="12700">
+            <a:solidFill>
+              <a:schemeClr val="tx1"/>
+            </a:solidFill>
+            <a:tailEnd type="triangle"/>
+          </a:ln>
+        </p:spPr>
+        <p:style>
+          <a:lnRef idx="1">
+            <a:schemeClr val="dk1"/>
+          </a:lnRef>
+          <a:fillRef idx="0">
+            <a:schemeClr val="dk1"/>
+          </a:fillRef>
+          <a:effectRef idx="0">
+            <a:schemeClr val="dk1"/>
+          </a:effectRef>
+          <a:fontRef idx="minor">
+            <a:schemeClr val="tx1"/>
+          </a:fontRef>
+        </p:style>
+      </p:cxnSp>
+      <p:sp>
+        <p:nvSpPr>
+          <p:cNvPr id="40" name="Rectangle: Rounded Corners 39">
+            <a:extLst>
+              <a:ext uri="{FF2B5EF4-FFF2-40B4-BE49-F238E27FC236}">
+                <a16:creationId xmlns:a16="http://schemas.microsoft.com/office/drawing/2014/main" id="{4EF8B2D1-3FFE-4E1C-A8E6-5CA81E37F4C2}"/>
+              </a:ext>
+            </a:extLst>
+          </p:cNvPr>
+          <p:cNvSpPr/>
+          <p:nvPr/>
+        </p:nvSpPr>
+        <p:spPr>
+          <a:xfrm>
+            <a:off x="1394810" y="1756447"/>
+            <a:ext cx="1267688" cy="504465"/>
+          </a:xfrm>
+          <a:prstGeom prst="roundRect">
+            <a:avLst/>
+          </a:prstGeom>
+          <a:solidFill>
+            <a:schemeClr val="bg1"/>
+          </a:solidFill>
+          <a:ln>
+            <a:solidFill>
+              <a:srgbClr val="44AED8"/>
+            </a:solidFill>
+            <a:prstDash val="dash"/>
+          </a:ln>
+        </p:spPr>
+        <p:style>
+          <a:lnRef idx="2">
+            <a:schemeClr val="accent5">
+              <a:shade val="50000"/>
+            </a:schemeClr>
+          </a:lnRef>
+          <a:fillRef idx="1">
+            <a:schemeClr val="accent5"/>
+          </a:fillRef>
+          <a:effectRef idx="0">
+            <a:schemeClr val="accent5"/>
+          </a:effectRef>
+          <a:fontRef idx="minor">
+            <a:schemeClr val="lt1"/>
+          </a:fontRef>
+        </p:style>
+        <p:txBody>
+          <a:bodyPr rtlCol="0" anchor="ctr"/>
+          <a:lstStyle/>
+          <a:p>
+            <a:pPr algn="ctr"/>
+            <a:r>
+              <a:rPr lang="en-US" sz="1100" dirty="0">
+                <a:solidFill>
+                  <a:schemeClr val="tx1"/>
+                </a:solidFill>
+              </a:rPr>
+              <a:t>Old inferior MI</a:t>
+            </a:r>
+          </a:p>
+          <a:p>
+            <a:pPr algn="ctr"/>
+            <a:r>
+              <a:rPr lang="en-US" sz="1100" dirty="0">
+                <a:solidFill>
+                  <a:schemeClr val="tx1">
+                    <a:lumMod val="50000"/>
+                    <a:lumOff val="50000"/>
+                  </a:schemeClr>
+                </a:solidFill>
+              </a:rPr>
+              <a:t>4121467</a:t>
+            </a:r>
+          </a:p>
+        </p:txBody>
+      </p:sp>
+      <p:cxnSp>
+        <p:nvCxnSpPr>
+          <p:cNvPr id="48" name="Connector: Elbow 47">
+            <a:extLst>
+              <a:ext uri="{FF2B5EF4-FFF2-40B4-BE49-F238E27FC236}">
+                <a16:creationId xmlns:a16="http://schemas.microsoft.com/office/drawing/2014/main" id="{2D1B8B4C-C734-40C1-BEBD-22742C5EEBCF}"/>
+              </a:ext>
+            </a:extLst>
+          </p:cNvPr>
+          <p:cNvCxnSpPr>
+            <a:cxnSpLocks/>
+            <a:stCxn id="10" idx="2"/>
+            <a:endCxn id="40" idx="0"/>
+          </p:cNvCxnSpPr>
+          <p:nvPr/>
+        </p:nvCxnSpPr>
+        <p:spPr>
+          <a:xfrm flipH="1">
+            <a:off x="2028654" y="1431739"/>
+            <a:ext cx="1492" cy="324708"/>
+          </a:xfrm>
+          <a:prstGeom prst="straightConnector1">
+            <a:avLst/>
+          </a:prstGeom>
+          <a:ln w="12700">
+            <a:solidFill>
+              <a:schemeClr val="tx1"/>
+            </a:solidFill>
+            <a:tailEnd type="triangle"/>
+          </a:ln>
+        </p:spPr>
+        <p:style>
+          <a:lnRef idx="1">
+            <a:schemeClr val="dk1"/>
+          </a:lnRef>
+          <a:fillRef idx="0">
+            <a:schemeClr val="dk1"/>
+          </a:fillRef>
+          <a:effectRef idx="0">
+            <a:schemeClr val="dk1"/>
+          </a:effectRef>
+          <a:fontRef idx="minor">
+            <a:schemeClr val="tx1"/>
+          </a:fontRef>
+        </p:style>
+      </p:cxnSp>
+      <p:sp>
+        <p:nvSpPr>
+          <p:cNvPr id="61" name="Rectangle: Rounded Corners 60">
+            <a:extLst>
+              <a:ext uri="{FF2B5EF4-FFF2-40B4-BE49-F238E27FC236}">
+                <a16:creationId xmlns:a16="http://schemas.microsoft.com/office/drawing/2014/main" id="{F42B3505-2DAC-455D-AB7B-62655FA90981}"/>
+              </a:ext>
+            </a:extLst>
+          </p:cNvPr>
+          <p:cNvSpPr/>
+          <p:nvPr/>
+        </p:nvSpPr>
+        <p:spPr>
+          <a:xfrm>
+            <a:off x="2722300" y="1756446"/>
+            <a:ext cx="1267428" cy="504465"/>
+          </a:xfrm>
+          <a:prstGeom prst="roundRect">
+            <a:avLst/>
+          </a:prstGeom>
+          <a:solidFill>
+            <a:schemeClr val="bg1"/>
+          </a:solidFill>
+          <a:ln>
+            <a:solidFill>
+              <a:schemeClr val="bg1"/>
+            </a:solidFill>
+          </a:ln>
+        </p:spPr>
+        <p:style>
+          <a:lnRef idx="2">
+            <a:schemeClr val="accent5">
+              <a:shade val="50000"/>
+            </a:schemeClr>
+          </a:lnRef>
+          <a:fillRef idx="1">
+            <a:schemeClr val="accent5"/>
+          </a:fillRef>
+          <a:effectRef idx="0">
+            <a:schemeClr val="accent5"/>
+          </a:effectRef>
+          <a:fontRef idx="minor">
+            <a:schemeClr val="lt1"/>
+          </a:fontRef>
+        </p:style>
+        <p:txBody>
+          <a:bodyPr rtlCol="0" anchor="ctr"/>
+          <a:lstStyle/>
+          <a:p>
+            <a:pPr algn="ctr"/>
+            <a:r>
+              <a:rPr lang="en-US" sz="2400" dirty="0">
+                <a:solidFill>
+                  <a:schemeClr val="tx1"/>
+                </a:solidFill>
+              </a:rPr>
+              <a:t>…</a:t>
+            </a:r>
+          </a:p>
+        </p:txBody>
+      </p:sp>
+      <p:sp>
+        <p:nvSpPr>
+          <p:cNvPr id="67" name="Rectangle: Rounded Corners 66">
+            <a:extLst>
+              <a:ext uri="{FF2B5EF4-FFF2-40B4-BE49-F238E27FC236}">
+                <a16:creationId xmlns:a16="http://schemas.microsoft.com/office/drawing/2014/main" id="{0C271D8C-C12F-42AE-9A75-5A81941CD52D}"/>
+              </a:ext>
+            </a:extLst>
+          </p:cNvPr>
+          <p:cNvSpPr/>
+          <p:nvPr/>
+        </p:nvSpPr>
+        <p:spPr>
+          <a:xfrm>
+            <a:off x="4048170" y="1756449"/>
+            <a:ext cx="1267428" cy="504465"/>
+          </a:xfrm>
+          <a:prstGeom prst="roundRect">
+            <a:avLst/>
+          </a:prstGeom>
+          <a:solidFill>
+            <a:srgbClr val="44AED8"/>
+          </a:solidFill>
+          <a:ln>
+            <a:noFill/>
+          </a:ln>
+        </p:spPr>
+        <p:style>
+          <a:lnRef idx="2">
+            <a:schemeClr val="accent5">
+              <a:shade val="50000"/>
+            </a:schemeClr>
+          </a:lnRef>
+          <a:fillRef idx="1">
+            <a:schemeClr val="accent5"/>
+          </a:fillRef>
+          <a:effectRef idx="0">
+            <a:schemeClr val="accent5"/>
+          </a:effectRef>
+          <a:fontRef idx="minor">
+            <a:schemeClr val="lt1"/>
+          </a:fontRef>
+        </p:style>
+        <p:txBody>
+          <a:bodyPr rtlCol="0" anchor="ctr"/>
+          <a:lstStyle/>
+          <a:p>
+            <a:pPr algn="ctr"/>
+            <a:r>
+              <a:rPr lang="en-US" sz="1100" dirty="0"/>
+              <a:t>Acute Q wave MI</a:t>
+            </a:r>
+          </a:p>
+          <a:p>
+            <a:pPr algn="ctr"/>
+            <a:r>
+              <a:rPr lang="en-US" sz="1100" dirty="0">
+                <a:solidFill>
+                  <a:srgbClr val="D9EEF7"/>
+                </a:solidFill>
+              </a:rPr>
+              <a:t>4126801</a:t>
+            </a:r>
+          </a:p>
+        </p:txBody>
+      </p:sp>
+      <p:cxnSp>
+        <p:nvCxnSpPr>
+          <p:cNvPr id="68" name="Connector: Elbow 67">
+            <a:extLst>
+              <a:ext uri="{FF2B5EF4-FFF2-40B4-BE49-F238E27FC236}">
+                <a16:creationId xmlns:a16="http://schemas.microsoft.com/office/drawing/2014/main" id="{CDEA2FE6-114D-44F6-A8EB-36B9F15745FF}"/>
+              </a:ext>
+            </a:extLst>
+          </p:cNvPr>
+          <p:cNvCxnSpPr>
+            <a:cxnSpLocks/>
+            <a:stCxn id="21" idx="2"/>
+            <a:endCxn id="67" idx="0"/>
+          </p:cNvCxnSpPr>
+          <p:nvPr/>
+        </p:nvCxnSpPr>
+        <p:spPr>
+          <a:xfrm rot="5400000">
+            <a:off x="4520209" y="1593414"/>
+            <a:ext cx="324710" cy="1360"/>
+          </a:xfrm>
+          <a:prstGeom prst="bentConnector3">
+            <a:avLst>
+              <a:gd name="adj1" fmla="val 50000"/>
+            </a:avLst>
+          </a:prstGeom>
+          <a:ln w="12700">
+            <a:solidFill>
+              <a:schemeClr val="tx1"/>
+            </a:solidFill>
+            <a:tailEnd type="triangle"/>
+          </a:ln>
+        </p:spPr>
+        <p:style>
+          <a:lnRef idx="1">
+            <a:schemeClr val="dk1"/>
+          </a:lnRef>
+          <a:fillRef idx="0">
+            <a:schemeClr val="dk1"/>
+          </a:fillRef>
+          <a:effectRef idx="0">
+            <a:schemeClr val="dk1"/>
+          </a:effectRef>
+          <a:fontRef idx="minor">
+            <a:schemeClr val="tx1"/>
+          </a:fontRef>
+        </p:style>
+      </p:cxnSp>
+      <p:sp>
+        <p:nvSpPr>
+          <p:cNvPr id="71" name="Rectangle: Rounded Corners 70">
+            <a:extLst>
+              <a:ext uri="{FF2B5EF4-FFF2-40B4-BE49-F238E27FC236}">
+                <a16:creationId xmlns:a16="http://schemas.microsoft.com/office/drawing/2014/main" id="{AE5558A0-E482-445A-80A5-D9B8B021D55A}"/>
+              </a:ext>
+            </a:extLst>
+          </p:cNvPr>
+          <p:cNvSpPr/>
+          <p:nvPr/>
+        </p:nvSpPr>
+        <p:spPr>
+          <a:xfrm>
+            <a:off x="5376760" y="1756448"/>
+            <a:ext cx="1267428" cy="504465"/>
+          </a:xfrm>
+          <a:prstGeom prst="roundRect">
+            <a:avLst/>
+          </a:prstGeom>
+          <a:solidFill>
+            <a:schemeClr val="bg1"/>
+          </a:solidFill>
+          <a:ln>
+            <a:solidFill>
+              <a:schemeClr val="bg1"/>
+            </a:solidFill>
+          </a:ln>
+        </p:spPr>
+        <p:style>
+          <a:lnRef idx="2">
+            <a:schemeClr val="accent5">
+              <a:shade val="50000"/>
+            </a:schemeClr>
+          </a:lnRef>
+          <a:fillRef idx="1">
+            <a:schemeClr val="accent5"/>
+          </a:fillRef>
+          <a:effectRef idx="0">
+            <a:schemeClr val="accent5"/>
+          </a:effectRef>
+          <a:fontRef idx="minor">
+            <a:schemeClr val="lt1"/>
+          </a:fontRef>
+        </p:style>
+        <p:txBody>
+          <a:bodyPr rtlCol="0" anchor="ctr"/>
+          <a:lstStyle/>
+          <a:p>
+            <a:pPr algn="ctr"/>
+            <a:r>
+              <a:rPr lang="en-US" sz="2400" dirty="0">
+                <a:solidFill>
+                  <a:schemeClr val="tx1"/>
+                </a:solidFill>
+              </a:rPr>
+              <a:t>…</a:t>
+            </a:r>
+          </a:p>
+        </p:txBody>
+      </p:sp>
+      <p:cxnSp>
+        <p:nvCxnSpPr>
+          <p:cNvPr id="72" name="Connector: Elbow 71">
+            <a:extLst>
+              <a:ext uri="{FF2B5EF4-FFF2-40B4-BE49-F238E27FC236}">
+                <a16:creationId xmlns:a16="http://schemas.microsoft.com/office/drawing/2014/main" id="{7D975D7D-E388-4FA4-84E0-BEBAF164757D}"/>
+              </a:ext>
+            </a:extLst>
+          </p:cNvPr>
+          <p:cNvCxnSpPr>
+            <a:cxnSpLocks/>
+            <a:stCxn id="10" idx="2"/>
+            <a:endCxn id="61" idx="0"/>
+          </p:cNvCxnSpPr>
+          <p:nvPr/>
+        </p:nvCxnSpPr>
+        <p:spPr>
+          <a:xfrm rot="16200000" flipH="1">
+            <a:off x="2530727" y="931158"/>
+            <a:ext cx="324707" cy="1325868"/>
+          </a:xfrm>
+          <a:prstGeom prst="bentConnector3">
+            <a:avLst>
+              <a:gd name="adj1" fmla="val 50000"/>
+            </a:avLst>
+          </a:prstGeom>
+          <a:ln w="12700">
+            <a:solidFill>
+              <a:schemeClr val="tx1"/>
+            </a:solidFill>
+            <a:tailEnd type="triangle"/>
+          </a:ln>
+        </p:spPr>
+        <p:style>
+          <a:lnRef idx="1">
+            <a:schemeClr val="dk1"/>
+          </a:lnRef>
+          <a:fillRef idx="0">
+            <a:schemeClr val="dk1"/>
+          </a:fillRef>
+          <a:effectRef idx="0">
+            <a:schemeClr val="dk1"/>
+          </a:effectRef>
+          <a:fontRef idx="minor">
+            <a:schemeClr val="tx1"/>
+          </a:fontRef>
+        </p:style>
+      </p:cxnSp>
+      <p:cxnSp>
+        <p:nvCxnSpPr>
+          <p:cNvPr id="75" name="Connector: Elbow 74">
+            <a:extLst>
+              <a:ext uri="{FF2B5EF4-FFF2-40B4-BE49-F238E27FC236}">
+                <a16:creationId xmlns:a16="http://schemas.microsoft.com/office/drawing/2014/main" id="{47BA88F5-C009-4E8C-B1A6-73BA401E2E27}"/>
+              </a:ext>
+            </a:extLst>
+          </p:cNvPr>
+          <p:cNvCxnSpPr>
+            <a:cxnSpLocks/>
+            <a:stCxn id="21" idx="2"/>
+            <a:endCxn id="71" idx="0"/>
+          </p:cNvCxnSpPr>
+          <p:nvPr/>
+        </p:nvCxnSpPr>
+        <p:spPr>
+          <a:xfrm rot="16200000" flipH="1">
+            <a:off x="5184505" y="930478"/>
+            <a:ext cx="324709" cy="1327230"/>
+          </a:xfrm>
+          <a:prstGeom prst="bentConnector3">
+            <a:avLst>
+              <a:gd name="adj1" fmla="val 50000"/>
+            </a:avLst>
+          </a:prstGeom>
+          <a:ln w="12700">
+            <a:solidFill>
+              <a:schemeClr val="tx1"/>
+            </a:solidFill>
+            <a:tailEnd type="triangle"/>
+          </a:ln>
+        </p:spPr>
+        <p:style>
+          <a:lnRef idx="1">
+            <a:schemeClr val="dk1"/>
+          </a:lnRef>
+          <a:fillRef idx="0">
+            <a:schemeClr val="dk1"/>
+          </a:fillRef>
+          <a:effectRef idx="0">
+            <a:schemeClr val="dk1"/>
+          </a:effectRef>
+          <a:fontRef idx="minor">
+            <a:schemeClr val="tx1"/>
+          </a:fontRef>
+        </p:style>
+      </p:cxnSp>
+    </p:spTree>
+    <p:extLst>
+      <p:ext uri="{BB962C8B-B14F-4D97-AF65-F5344CB8AC3E}">
+        <p14:creationId xmlns:p14="http://schemas.microsoft.com/office/powerpoint/2010/main" val="3787807833"/>
+      </p:ext>
+    </p:extLst>
+  </p:cSld>
+  <p:clrMapOvr>
+    <a:masterClrMapping/>
+  </p:clrMapOvr>
+</p:sld>
+</file>
+
+<file path=ppt/slides/slide2.xml><?xml version="1.0" encoding="utf-8"?>
+<p:sld xmlns:a="http://schemas.openxmlformats.org/drawingml/2006/main" xmlns:r="http://schemas.openxmlformats.org/officeDocument/2006/relationships" xmlns:p="http://schemas.openxmlformats.org/presentationml/2006/main">
+  <p:cSld>
+    <p:spTree>
+      <p:nvGrpSpPr>
+        <p:cNvPr id="1" name=""/>
+        <p:cNvGrpSpPr/>
+        <p:nvPr/>
+      </p:nvGrpSpPr>
+      <p:grpSpPr>
+        <a:xfrm>
+          <a:off x="0" y="0"/>
+          <a:ext cx="0" cy="0"/>
+          <a:chOff x="0" y="0"/>
+          <a:chExt cx="0" cy="0"/>
+        </a:xfrm>
+      </p:grpSpPr>
+      <p:sp>
+        <p:nvSpPr>
           <p:cNvPr id="4" name="Rectangle: Rounded Corners 3">
             <a:extLst>
               <a:ext uri="{FF2B5EF4-FFF2-40B4-BE49-F238E27FC236}">
@@ -5267,7 +6403,7 @@
 </p:sld>
 </file>
 
-<file path=ppt/slides/slide2.xml><?xml version="1.0" encoding="utf-8"?>
+<file path=ppt/slides/slide3.xml><?xml version="1.0" encoding="utf-8"?>
 <p:sld xmlns:a="http://schemas.openxmlformats.org/drawingml/2006/main" xmlns:r="http://schemas.openxmlformats.org/officeDocument/2006/relationships" xmlns:p="http://schemas.openxmlformats.org/presentationml/2006/main">
   <p:cSld>
     <p:spTree>
@@ -9181,7 +10317,7 @@
 </p:sld>
 </file>
 
-<file path=ppt/slides/slide3.xml><?xml version="1.0" encoding="utf-8"?>
+<file path=ppt/slides/slide4.xml><?xml version="1.0" encoding="utf-8"?>
 <p:sld xmlns:a="http://schemas.openxmlformats.org/drawingml/2006/main" xmlns:r="http://schemas.openxmlformats.org/officeDocument/2006/relationships" xmlns:p="http://schemas.openxmlformats.org/presentationml/2006/main">
   <p:cSld>
     <p:spTree>

</xml_diff>